<commit_message>
added additional tasks and clarified presentation
</commit_message>
<xml_diff>
--- a/lecture_6/single cell.pptx
+++ b/lecture_6/single cell.pptx
@@ -15,7 +15,8 @@
     <p:sldId id="262" r:id="rId9"/>
     <p:sldId id="264" r:id="rId10"/>
     <p:sldId id="265" r:id="rId11"/>
-    <p:sldId id="261" r:id="rId12"/>
+    <p:sldId id="269" r:id="rId12"/>
+    <p:sldId id="261" r:id="rId13"/>
   </p:sldIdLst>
   <p:sldSz cx="12192000" cy="6858000"/>
   <p:notesSz cx="6858000" cy="9144000"/>
@@ -3643,7 +3644,7 @@
           <a:p>
             <a:fld id="{95BE6E05-47DF-9844-809F-918ED79852BE}" type="datetimeFigureOut">
               <a:rPr lang="en-US" smtClean="0"/>
-              <a:t>6/30/2023</a:t>
+              <a:t>7/2/2024</a:t>
             </a:fld>
             <a:endParaRPr lang="en-US"/>
           </a:p>
@@ -3841,7 +3842,7 @@
           <a:p>
             <a:fld id="{95BE6E05-47DF-9844-809F-918ED79852BE}" type="datetimeFigureOut">
               <a:rPr lang="en-US" smtClean="0"/>
-              <a:t>6/30/2023</a:t>
+              <a:t>7/2/2024</a:t>
             </a:fld>
             <a:endParaRPr lang="en-US"/>
           </a:p>
@@ -4049,7 +4050,7 @@
           <a:p>
             <a:fld id="{95BE6E05-47DF-9844-809F-918ED79852BE}" type="datetimeFigureOut">
               <a:rPr lang="en-US" smtClean="0"/>
-              <a:t>6/30/2023</a:t>
+              <a:t>7/2/2024</a:t>
             </a:fld>
             <a:endParaRPr lang="en-US"/>
           </a:p>
@@ -4247,7 +4248,7 @@
           <a:p>
             <a:fld id="{95BE6E05-47DF-9844-809F-918ED79852BE}" type="datetimeFigureOut">
               <a:rPr lang="en-US" smtClean="0"/>
-              <a:t>6/30/2023</a:t>
+              <a:t>7/2/2024</a:t>
             </a:fld>
             <a:endParaRPr lang="en-US"/>
           </a:p>
@@ -4522,7 +4523,7 @@
           <a:p>
             <a:fld id="{95BE6E05-47DF-9844-809F-918ED79852BE}" type="datetimeFigureOut">
               <a:rPr lang="en-US" smtClean="0"/>
-              <a:t>6/30/2023</a:t>
+              <a:t>7/2/2024</a:t>
             </a:fld>
             <a:endParaRPr lang="en-US"/>
           </a:p>
@@ -4787,7 +4788,7 @@
           <a:p>
             <a:fld id="{95BE6E05-47DF-9844-809F-918ED79852BE}" type="datetimeFigureOut">
               <a:rPr lang="en-US" smtClean="0"/>
-              <a:t>6/30/2023</a:t>
+              <a:t>7/2/2024</a:t>
             </a:fld>
             <a:endParaRPr lang="en-US"/>
           </a:p>
@@ -5199,7 +5200,7 @@
           <a:p>
             <a:fld id="{95BE6E05-47DF-9844-809F-918ED79852BE}" type="datetimeFigureOut">
               <a:rPr lang="en-US" smtClean="0"/>
-              <a:t>6/30/2023</a:t>
+              <a:t>7/2/2024</a:t>
             </a:fld>
             <a:endParaRPr lang="en-US"/>
           </a:p>
@@ -5340,7 +5341,7 @@
           <a:p>
             <a:fld id="{95BE6E05-47DF-9844-809F-918ED79852BE}" type="datetimeFigureOut">
               <a:rPr lang="en-US" smtClean="0"/>
-              <a:t>6/30/2023</a:t>
+              <a:t>7/2/2024</a:t>
             </a:fld>
             <a:endParaRPr lang="en-US"/>
           </a:p>
@@ -5453,7 +5454,7 @@
           <a:p>
             <a:fld id="{95BE6E05-47DF-9844-809F-918ED79852BE}" type="datetimeFigureOut">
               <a:rPr lang="en-US" smtClean="0"/>
-              <a:t>6/30/2023</a:t>
+              <a:t>7/2/2024</a:t>
             </a:fld>
             <a:endParaRPr lang="en-US"/>
           </a:p>
@@ -5764,7 +5765,7 @@
           <a:p>
             <a:fld id="{95BE6E05-47DF-9844-809F-918ED79852BE}" type="datetimeFigureOut">
               <a:rPr lang="en-US" smtClean="0"/>
-              <a:t>6/30/2023</a:t>
+              <a:t>7/2/2024</a:t>
             </a:fld>
             <a:endParaRPr lang="en-US"/>
           </a:p>
@@ -6052,7 +6053,7 @@
           <a:p>
             <a:fld id="{95BE6E05-47DF-9844-809F-918ED79852BE}" type="datetimeFigureOut">
               <a:rPr lang="en-US" smtClean="0"/>
-              <a:t>6/30/2023</a:t>
+              <a:t>7/2/2024</a:t>
             </a:fld>
             <a:endParaRPr lang="en-US"/>
           </a:p>
@@ -6293,7 +6294,7 @@
           <a:p>
             <a:fld id="{95BE6E05-47DF-9844-809F-918ED79852BE}" type="datetimeFigureOut">
               <a:rPr lang="en-US" smtClean="0"/>
-              <a:t>6/30/2023</a:t>
+              <a:t>7/2/2024</a:t>
             </a:fld>
             <a:endParaRPr lang="en-US"/>
           </a:p>
@@ -6947,6 +6948,156 @@
 </file>
 
 <file path=ppt/slides/slide11.xml><?xml version="1.0" encoding="utf-8"?>
+<p:sld xmlns:a="http://schemas.openxmlformats.org/drawingml/2006/main" xmlns:r="http://schemas.openxmlformats.org/officeDocument/2006/relationships" xmlns:p="http://schemas.openxmlformats.org/presentationml/2006/main">
+  <p:cSld>
+    <p:spTree>
+      <p:nvGrpSpPr>
+        <p:cNvPr id="1" name=""/>
+        <p:cNvGrpSpPr/>
+        <p:nvPr/>
+      </p:nvGrpSpPr>
+      <p:grpSpPr>
+        <a:xfrm>
+          <a:off x="0" y="0"/>
+          <a:ext cx="0" cy="0"/>
+          <a:chOff x="0" y="0"/>
+          <a:chExt cx="0" cy="0"/>
+        </a:xfrm>
+      </p:grpSpPr>
+      <p:sp>
+        <p:nvSpPr>
+          <p:cNvPr id="2" name="Title 1">
+            <a:extLst>
+              <a:ext uri="{FF2B5EF4-FFF2-40B4-BE49-F238E27FC236}">
+                <a16:creationId xmlns:a16="http://schemas.microsoft.com/office/drawing/2014/main" id="{E4EE68D3-1C15-353A-7977-F43205C73528}"/>
+              </a:ext>
+            </a:extLst>
+          </p:cNvPr>
+          <p:cNvSpPr>
+            <a:spLocks noGrp="1"/>
+          </p:cNvSpPr>
+          <p:nvPr>
+            <p:ph type="title"/>
+          </p:nvPr>
+        </p:nvSpPr>
+        <p:spPr/>
+        <p:txBody>
+          <a:bodyPr/>
+          <a:lstStyle/>
+          <a:p>
+            <a:r>
+              <a:rPr lang="en-US" dirty="0"/>
+              <a:t>Sketching Single Cell Data</a:t>
+            </a:r>
+          </a:p>
+        </p:txBody>
+      </p:sp>
+      <p:sp>
+        <p:nvSpPr>
+          <p:cNvPr id="3" name="Content Placeholder 2">
+            <a:extLst>
+              <a:ext uri="{FF2B5EF4-FFF2-40B4-BE49-F238E27FC236}">
+                <a16:creationId xmlns:a16="http://schemas.microsoft.com/office/drawing/2014/main" id="{1C6C5DD6-5CC8-0C7D-A8A0-B72F2F08BBCB}"/>
+              </a:ext>
+            </a:extLst>
+          </p:cNvPr>
+          <p:cNvSpPr>
+            <a:spLocks noGrp="1"/>
+          </p:cNvSpPr>
+          <p:nvPr>
+            <p:ph idx="1"/>
+          </p:nvPr>
+        </p:nvSpPr>
+        <p:spPr>
+          <a:xfrm>
+            <a:off x="838200" y="1825625"/>
+            <a:ext cx="5507421" cy="4351338"/>
+          </a:xfrm>
+        </p:spPr>
+        <p:txBody>
+          <a:bodyPr/>
+          <a:lstStyle/>
+          <a:p>
+            <a:r>
+              <a:rPr lang="en-US" dirty="0"/>
+              <a:t>Single Cell Data is becoming larger and larger (Millions of cells)</a:t>
+            </a:r>
+          </a:p>
+          <a:p>
+            <a:r>
+              <a:rPr lang="en-US" dirty="0"/>
+              <a:t>Very challenging to read all of that into memory</a:t>
+            </a:r>
+          </a:p>
+          <a:p>
+            <a:r>
+              <a:rPr lang="en-US" dirty="0"/>
+              <a:t>Instead we summarize the data with representative samples to do analysis</a:t>
+            </a:r>
+          </a:p>
+        </p:txBody>
+      </p:sp>
+      <p:pic>
+        <p:nvPicPr>
+          <p:cNvPr id="1026" name="Picture 2">
+            <a:extLst>
+              <a:ext uri="{FF2B5EF4-FFF2-40B4-BE49-F238E27FC236}">
+                <a16:creationId xmlns:a16="http://schemas.microsoft.com/office/drawing/2014/main" id="{0741889B-DA3B-AC02-29E2-F61006C5D1A3}"/>
+              </a:ext>
+            </a:extLst>
+          </p:cNvPr>
+          <p:cNvPicPr>
+            <a:picLocks noChangeAspect="1" noChangeArrowheads="1"/>
+          </p:cNvPicPr>
+          <p:nvPr/>
+        </p:nvPicPr>
+        <p:blipFill>
+          <a:blip r:embed="rId2">
+            <a:extLst>
+              <a:ext uri="{28A0092B-C50C-407E-A947-70E740481C1C}">
+                <a14:useLocalDpi xmlns:a14="http://schemas.microsoft.com/office/drawing/2010/main" val="0"/>
+              </a:ext>
+            </a:extLst>
+          </a:blip>
+          <a:srcRect/>
+          <a:stretch>
+            <a:fillRect/>
+          </a:stretch>
+        </p:blipFill>
+        <p:spPr bwMode="auto">
+          <a:xfrm>
+            <a:off x="6573702" y="1247583"/>
+            <a:ext cx="5507421" cy="5507421"/>
+          </a:xfrm>
+          <a:prstGeom prst="rect">
+            <a:avLst/>
+          </a:prstGeom>
+          <a:noFill/>
+          <a:extLst>
+            <a:ext uri="{909E8E84-426E-40DD-AFC4-6F175D3DCCD1}">
+              <a14:hiddenFill xmlns:a14="http://schemas.microsoft.com/office/drawing/2010/main">
+                <a:solidFill>
+                  <a:srgbClr val="FFFFFF"/>
+                </a:solidFill>
+              </a14:hiddenFill>
+            </a:ext>
+          </a:extLst>
+        </p:spPr>
+      </p:pic>
+    </p:spTree>
+    <p:extLst>
+      <p:ext uri="{BB962C8B-B14F-4D97-AF65-F5344CB8AC3E}">
+        <p14:creationId xmlns:p14="http://schemas.microsoft.com/office/powerpoint/2010/main" val="3205440802"/>
+      </p:ext>
+    </p:extLst>
+  </p:cSld>
+  <p:clrMapOvr>
+    <a:masterClrMapping/>
+  </p:clrMapOvr>
+</p:sld>
+</file>
+
+<file path=ppt/slides/slide12.xml><?xml version="1.0" encoding="utf-8"?>
 <p:sld xmlns:a="http://schemas.openxmlformats.org/drawingml/2006/main" xmlns:r="http://schemas.openxmlformats.org/officeDocument/2006/relationships" xmlns:p="http://schemas.openxmlformats.org/presentationml/2006/main">
   <p:cSld>
     <p:spTree>

</xml_diff>